<commit_message>
added simplegraph1.txt, simple equivalent version, MIP still working
</commit_message>
<xml_diff>
--- a/arspi_infrastructure.pptx
+++ b/arspi_infrastructure.pptx
@@ -7,6 +7,7 @@
   <p:sldIdLst>
     <p:sldId id="256" r:id="rId2"/>
     <p:sldId id="257" r:id="rId3"/>
+    <p:sldId id="258" r:id="rId4"/>
   </p:sldIdLst>
   <p:sldSz cx="12192000" cy="6858000"/>
   <p:notesSz cx="6858000" cy="9144000"/>
@@ -105,6 +106,11 @@
       </a:defRPr>
     </a:lvl9pPr>
   </p:defaultTextStyle>
+  <p:extLst>
+    <p:ext uri="{EFAFB233-063F-42B5-8137-9DF3F51BA10A}">
+      <p15:sldGuideLst xmlns:p15="http://schemas.microsoft.com/office/powerpoint/2012/main"/>
+    </p:ext>
+  </p:extLst>
 </p:presentation>
 </file>
 
@@ -255,7 +261,7 @@
           <a:p>
             <a:fld id="{540F29C6-B467-B041-83EA-723E09616B35}" type="datetimeFigureOut">
               <a:rPr lang="en-US" smtClean="0"/>
-              <a:t>5/18/21</a:t>
+              <a:t>5/25/21</a:t>
             </a:fld>
             <a:endParaRPr lang="en-US"/>
           </a:p>
@@ -453,7 +459,7 @@
           <a:p>
             <a:fld id="{540F29C6-B467-B041-83EA-723E09616B35}" type="datetimeFigureOut">
               <a:rPr lang="en-US" smtClean="0"/>
-              <a:t>5/18/21</a:t>
+              <a:t>5/25/21</a:t>
             </a:fld>
             <a:endParaRPr lang="en-US"/>
           </a:p>
@@ -661,7 +667,7 @@
           <a:p>
             <a:fld id="{540F29C6-B467-B041-83EA-723E09616B35}" type="datetimeFigureOut">
               <a:rPr lang="en-US" smtClean="0"/>
-              <a:t>5/18/21</a:t>
+              <a:t>5/25/21</a:t>
             </a:fld>
             <a:endParaRPr lang="en-US"/>
           </a:p>
@@ -859,7 +865,7 @@
           <a:p>
             <a:fld id="{540F29C6-B467-B041-83EA-723E09616B35}" type="datetimeFigureOut">
               <a:rPr lang="en-US" smtClean="0"/>
-              <a:t>5/18/21</a:t>
+              <a:t>5/25/21</a:t>
             </a:fld>
             <a:endParaRPr lang="en-US"/>
           </a:p>
@@ -1134,7 +1140,7 @@
           <a:p>
             <a:fld id="{540F29C6-B467-B041-83EA-723E09616B35}" type="datetimeFigureOut">
               <a:rPr lang="en-US" smtClean="0"/>
-              <a:t>5/18/21</a:t>
+              <a:t>5/25/21</a:t>
             </a:fld>
             <a:endParaRPr lang="en-US"/>
           </a:p>
@@ -1399,7 +1405,7 @@
           <a:p>
             <a:fld id="{540F29C6-B467-B041-83EA-723E09616B35}" type="datetimeFigureOut">
               <a:rPr lang="en-US" smtClean="0"/>
-              <a:t>5/18/21</a:t>
+              <a:t>5/25/21</a:t>
             </a:fld>
             <a:endParaRPr lang="en-US"/>
           </a:p>
@@ -1811,7 +1817,7 @@
           <a:p>
             <a:fld id="{540F29C6-B467-B041-83EA-723E09616B35}" type="datetimeFigureOut">
               <a:rPr lang="en-US" smtClean="0"/>
-              <a:t>5/18/21</a:t>
+              <a:t>5/25/21</a:t>
             </a:fld>
             <a:endParaRPr lang="en-US"/>
           </a:p>
@@ -1952,7 +1958,7 @@
           <a:p>
             <a:fld id="{540F29C6-B467-B041-83EA-723E09616B35}" type="datetimeFigureOut">
               <a:rPr lang="en-US" smtClean="0"/>
-              <a:t>5/18/21</a:t>
+              <a:t>5/25/21</a:t>
             </a:fld>
             <a:endParaRPr lang="en-US"/>
           </a:p>
@@ -2065,7 +2071,7 @@
           <a:p>
             <a:fld id="{540F29C6-B467-B041-83EA-723E09616B35}" type="datetimeFigureOut">
               <a:rPr lang="en-US" smtClean="0"/>
-              <a:t>5/18/21</a:t>
+              <a:t>5/25/21</a:t>
             </a:fld>
             <a:endParaRPr lang="en-US"/>
           </a:p>
@@ -2376,7 +2382,7 @@
           <a:p>
             <a:fld id="{540F29C6-B467-B041-83EA-723E09616B35}" type="datetimeFigureOut">
               <a:rPr lang="en-US" smtClean="0"/>
-              <a:t>5/18/21</a:t>
+              <a:t>5/25/21</a:t>
             </a:fld>
             <a:endParaRPr lang="en-US"/>
           </a:p>
@@ -2664,7 +2670,7 @@
           <a:p>
             <a:fld id="{540F29C6-B467-B041-83EA-723E09616B35}" type="datetimeFigureOut">
               <a:rPr lang="en-US" smtClean="0"/>
-              <a:t>5/18/21</a:t>
+              <a:t>5/25/21</a:t>
             </a:fld>
             <a:endParaRPr lang="en-US"/>
           </a:p>
@@ -2905,7 +2911,7 @@
           <a:p>
             <a:fld id="{540F29C6-B467-B041-83EA-723E09616B35}" type="datetimeFigureOut">
               <a:rPr lang="en-US" smtClean="0"/>
-              <a:t>5/18/21</a:t>
+              <a:t>5/25/21</a:t>
             </a:fld>
             <a:endParaRPr lang="en-US"/>
           </a:p>
@@ -3382,10 +3388,10 @@
       </p:grpSpPr>
       <p:sp>
         <p:nvSpPr>
-          <p:cNvPr id="4" name="Rounded Rectangle 3">
-            <a:extLst>
-              <a:ext uri="{FF2B5EF4-FFF2-40B4-BE49-F238E27FC236}">
-                <a16:creationId xmlns:a16="http://schemas.microsoft.com/office/drawing/2014/main" id="{6299FC71-9C08-AE49-8AE4-95095B96A4E9}"/>
+          <p:cNvPr id="17" name="Rounded Rectangle 16">
+            <a:extLst>
+              <a:ext uri="{FF2B5EF4-FFF2-40B4-BE49-F238E27FC236}">
+                <a16:creationId xmlns:a16="http://schemas.microsoft.com/office/drawing/2014/main" id="{F01BA1C2-5CBA-C840-9741-3FAEB2C478BA}"/>
               </a:ext>
             </a:extLst>
           </p:cNvPr>
@@ -3394,7 +3400,95 @@
         </p:nvSpPr>
         <p:spPr>
           <a:xfrm>
-            <a:off x="4472683" y="2157572"/>
+            <a:off x="224316" y="3451305"/>
+            <a:ext cx="11743367" cy="3000865"/>
+          </a:xfrm>
+          <a:prstGeom prst="roundRect">
+            <a:avLst/>
+          </a:prstGeom>
+        </p:spPr>
+        <p:style>
+          <a:lnRef idx="1">
+            <a:schemeClr val="accent3"/>
+          </a:lnRef>
+          <a:fillRef idx="2">
+            <a:schemeClr val="accent3"/>
+          </a:fillRef>
+          <a:effectRef idx="1">
+            <a:schemeClr val="accent3"/>
+          </a:effectRef>
+          <a:fontRef idx="minor">
+            <a:schemeClr val="dk1"/>
+          </a:fontRef>
+        </p:style>
+        <p:txBody>
+          <a:bodyPr rtlCol="0" anchor="ctr"/>
+          <a:lstStyle/>
+          <a:p>
+            <a:pPr algn="ctr"/>
+            <a:endParaRPr lang="en-US"/>
+          </a:p>
+        </p:txBody>
+      </p:sp>
+      <p:sp>
+        <p:nvSpPr>
+          <p:cNvPr id="15" name="Rounded Rectangle 14">
+            <a:extLst>
+              <a:ext uri="{FF2B5EF4-FFF2-40B4-BE49-F238E27FC236}">
+                <a16:creationId xmlns:a16="http://schemas.microsoft.com/office/drawing/2014/main" id="{AE6B7892-3304-6545-B29C-A4D8AC39FE9E}"/>
+              </a:ext>
+            </a:extLst>
+          </p:cNvPr>
+          <p:cNvSpPr/>
+          <p:nvPr/>
+        </p:nvSpPr>
+        <p:spPr>
+          <a:xfrm>
+            <a:off x="275687" y="791110"/>
+            <a:ext cx="11743367" cy="2311686"/>
+          </a:xfrm>
+          <a:prstGeom prst="roundRect">
+            <a:avLst/>
+          </a:prstGeom>
+        </p:spPr>
+        <p:style>
+          <a:lnRef idx="1">
+            <a:schemeClr val="accent3"/>
+          </a:lnRef>
+          <a:fillRef idx="2">
+            <a:schemeClr val="accent3"/>
+          </a:fillRef>
+          <a:effectRef idx="1">
+            <a:schemeClr val="accent3"/>
+          </a:effectRef>
+          <a:fontRef idx="minor">
+            <a:schemeClr val="dk1"/>
+          </a:fontRef>
+        </p:style>
+        <p:txBody>
+          <a:bodyPr rtlCol="0" anchor="ctr"/>
+          <a:lstStyle/>
+          <a:p>
+            <a:pPr algn="ctr"/>
+            <a:endParaRPr lang="en-US"/>
+          </a:p>
+        </p:txBody>
+      </p:sp>
+      <p:sp>
+        <p:nvSpPr>
+          <p:cNvPr id="4" name="Rounded Rectangle 3">
+            <a:extLst>
+              <a:ext uri="{FF2B5EF4-FFF2-40B4-BE49-F238E27FC236}">
+                <a16:creationId xmlns:a16="http://schemas.microsoft.com/office/drawing/2014/main" id="{6299FC71-9C08-AE49-8AE4-95095B96A4E9}"/>
+              </a:ext>
+            </a:extLst>
+          </p:cNvPr>
+          <p:cNvSpPr/>
+          <p:nvPr/>
+        </p:nvSpPr>
+        <p:spPr>
+          <a:xfrm>
+            <a:off x="4472683" y="2198661"/>
             <a:ext cx="3246634" cy="585627"/>
           </a:xfrm>
           <a:prstGeom prst="roundRect">
@@ -3443,7 +3537,7 @@
         </p:nvSpPr>
         <p:spPr>
           <a:xfrm>
-            <a:off x="1796264" y="3565128"/>
+            <a:off x="501718" y="3575401"/>
             <a:ext cx="3246634" cy="585627"/>
           </a:xfrm>
           <a:prstGeom prst="roundRect">
@@ -3473,17 +3567,17 @@
             <a:pPr algn="ctr"/>
             <a:r>
               <a:rPr lang="en-US" dirty="0"/>
-              <a:t>BiLinearM2Model</a:t>
-            </a:r>
-          </a:p>
-        </p:txBody>
-      </p:sp>
-      <p:sp>
-        <p:nvSpPr>
-          <p:cNvPr id="6" name="Rounded Rectangle 5">
-            <a:extLst>
-              <a:ext uri="{FF2B5EF4-FFF2-40B4-BE49-F238E27FC236}">
-                <a16:creationId xmlns:a16="http://schemas.microsoft.com/office/drawing/2014/main" id="{9A4F58E8-1508-3E41-80BB-ED9DB2FE5EF7}"/>
+              <a:t>BiLinearM2Model (6)-(10)</a:t>
+            </a:r>
+          </a:p>
+        </p:txBody>
+      </p:sp>
+      <p:sp>
+        <p:nvSpPr>
+          <p:cNvPr id="7" name="Rounded Rectangle 6">
+            <a:extLst>
+              <a:ext uri="{FF2B5EF4-FFF2-40B4-BE49-F238E27FC236}">
+                <a16:creationId xmlns:a16="http://schemas.microsoft.com/office/drawing/2014/main" id="{EBD1E084-523D-6840-9CFE-7C1FAB6D8BC8}"/>
               </a:ext>
             </a:extLst>
           </p:cNvPr>
@@ -3492,56 +3586,7 @@
         </p:nvSpPr>
         <p:spPr>
           <a:xfrm>
-            <a:off x="4472683" y="4520628"/>
-            <a:ext cx="3246634" cy="585627"/>
-          </a:xfrm>
-          <a:prstGeom prst="roundRect">
-            <a:avLst/>
-          </a:prstGeom>
-        </p:spPr>
-        <p:style>
-          <a:lnRef idx="2">
-            <a:schemeClr val="accent4">
-              <a:shade val="50000"/>
-            </a:schemeClr>
-          </a:lnRef>
-          <a:fillRef idx="1">
-            <a:schemeClr val="accent4"/>
-          </a:fillRef>
-          <a:effectRef idx="0">
-            <a:schemeClr val="accent4"/>
-          </a:effectRef>
-          <a:fontRef idx="minor">
-            <a:schemeClr val="lt1"/>
-          </a:fontRef>
-        </p:style>
-        <p:txBody>
-          <a:bodyPr rtlCol="0" anchor="ctr"/>
-          <a:lstStyle/>
-          <a:p>
-            <a:pPr algn="ctr"/>
-            <a:r>
-              <a:rPr lang="en-US" dirty="0"/>
-              <a:t>Benders</a:t>
-            </a:r>
-          </a:p>
-        </p:txBody>
-      </p:sp>
-      <p:sp>
-        <p:nvSpPr>
-          <p:cNvPr id="7" name="Rounded Rectangle 6">
-            <a:extLst>
-              <a:ext uri="{FF2B5EF4-FFF2-40B4-BE49-F238E27FC236}">
-                <a16:creationId xmlns:a16="http://schemas.microsoft.com/office/drawing/2014/main" id="{EBD1E084-523D-6840-9CFE-7C1FAB6D8BC8}"/>
-              </a:ext>
-            </a:extLst>
-          </p:cNvPr>
-          <p:cNvSpPr/>
-          <p:nvPr/>
-        </p:nvSpPr>
-        <p:spPr>
-          <a:xfrm>
-            <a:off x="7149103" y="3575402"/>
+            <a:off x="4472683" y="3575401"/>
             <a:ext cx="3246634" cy="585627"/>
           </a:xfrm>
           <a:prstGeom prst="roundRect">
@@ -3571,7 +3616,7 @@
             <a:pPr algn="ctr"/>
             <a:r>
               <a:rPr lang="en-US" dirty="0"/>
-              <a:t>LinearM2Model</a:t>
+              <a:t>LinearM2Model (17)-(21)</a:t>
             </a:r>
           </a:p>
         </p:txBody>
@@ -3619,10 +3664,423 @@
           <a:p>
             <a:pPr algn="ctr"/>
             <a:r>
-              <a:rPr lang="en-US" dirty="0" err="1"/>
+              <a:rPr lang="en-US" dirty="0"/>
               <a:t>LayerGraph</a:t>
             </a:r>
-            <a:endParaRPr lang="en-US" dirty="0"/>
+          </a:p>
+        </p:txBody>
+      </p:sp>
+      <p:sp>
+        <p:nvSpPr>
+          <p:cNvPr id="10" name="Rounded Rectangle 9">
+            <a:extLst>
+              <a:ext uri="{FF2B5EF4-FFF2-40B4-BE49-F238E27FC236}">
+                <a16:creationId xmlns:a16="http://schemas.microsoft.com/office/drawing/2014/main" id="{ACBBC19F-4835-EF4C-B859-EEC6F9EA0B68}"/>
+              </a:ext>
+            </a:extLst>
+          </p:cNvPr>
+          <p:cNvSpPr/>
+          <p:nvPr/>
+        </p:nvSpPr>
+        <p:spPr>
+          <a:xfrm>
+            <a:off x="8443648" y="3575401"/>
+            <a:ext cx="3246634" cy="585627"/>
+          </a:xfrm>
+          <a:prstGeom prst="roundRect">
+            <a:avLst/>
+          </a:prstGeom>
+        </p:spPr>
+        <p:style>
+          <a:lnRef idx="2">
+            <a:schemeClr val="accent6">
+              <a:shade val="50000"/>
+            </a:schemeClr>
+          </a:lnRef>
+          <a:fillRef idx="1">
+            <a:schemeClr val="accent6"/>
+          </a:fillRef>
+          <a:effectRef idx="0">
+            <a:schemeClr val="accent6"/>
+          </a:effectRef>
+          <a:fontRef idx="minor">
+            <a:schemeClr val="lt1"/>
+          </a:fontRef>
+        </p:style>
+        <p:txBody>
+          <a:bodyPr rtlCol="0" anchor="ctr"/>
+          <a:lstStyle/>
+          <a:p>
+            <a:pPr algn="ctr"/>
+            <a:r>
+              <a:rPr lang="en-US" dirty="0"/>
+              <a:t>M2Benders (25)-(26)</a:t>
+            </a:r>
+          </a:p>
+        </p:txBody>
+      </p:sp>
+      <p:sp>
+        <p:nvSpPr>
+          <p:cNvPr id="11" name="Rounded Rectangle 10">
+            <a:extLst>
+              <a:ext uri="{FF2B5EF4-FFF2-40B4-BE49-F238E27FC236}">
+                <a16:creationId xmlns:a16="http://schemas.microsoft.com/office/drawing/2014/main" id="{7F5B62F9-045C-C24C-A979-394ED912AC25}"/>
+              </a:ext>
+            </a:extLst>
+          </p:cNvPr>
+          <p:cNvSpPr/>
+          <p:nvPr/>
+        </p:nvSpPr>
+        <p:spPr>
+          <a:xfrm>
+            <a:off x="8443648" y="4609673"/>
+            <a:ext cx="3246634" cy="585627"/>
+          </a:xfrm>
+          <a:prstGeom prst="roundRect">
+            <a:avLst/>
+          </a:prstGeom>
+        </p:spPr>
+        <p:style>
+          <a:lnRef idx="2">
+            <a:schemeClr val="accent4">
+              <a:shade val="50000"/>
+            </a:schemeClr>
+          </a:lnRef>
+          <a:fillRef idx="1">
+            <a:schemeClr val="accent4"/>
+          </a:fillRef>
+          <a:effectRef idx="0">
+            <a:schemeClr val="accent4"/>
+          </a:effectRef>
+          <a:fontRef idx="minor">
+            <a:schemeClr val="lt1"/>
+          </a:fontRef>
+        </p:style>
+        <p:txBody>
+          <a:bodyPr rtlCol="0" anchor="ctr"/>
+          <a:lstStyle/>
+          <a:p>
+            <a:pPr algn="ctr"/>
+            <a:r>
+              <a:rPr lang="en-US" dirty="0"/>
+              <a:t>BendersSeparation (GRBCallback)</a:t>
+            </a:r>
+          </a:p>
+        </p:txBody>
+      </p:sp>
+      <p:sp>
+        <p:nvSpPr>
+          <p:cNvPr id="12" name="Rounded Rectangle 11">
+            <a:extLst>
+              <a:ext uri="{FF2B5EF4-FFF2-40B4-BE49-F238E27FC236}">
+                <a16:creationId xmlns:a16="http://schemas.microsoft.com/office/drawing/2014/main" id="{F3C3135E-7911-934C-BBAF-A6E21692141E}"/>
+              </a:ext>
+            </a:extLst>
+          </p:cNvPr>
+          <p:cNvSpPr/>
+          <p:nvPr/>
+        </p:nvSpPr>
+        <p:spPr>
+          <a:xfrm>
+            <a:off x="8443648" y="5645652"/>
+            <a:ext cx="3246634" cy="585627"/>
+          </a:xfrm>
+          <a:prstGeom prst="roundRect">
+            <a:avLst/>
+          </a:prstGeom>
+        </p:spPr>
+        <p:style>
+          <a:lnRef idx="2">
+            <a:schemeClr val="accent4">
+              <a:shade val="50000"/>
+            </a:schemeClr>
+          </a:lnRef>
+          <a:fillRef idx="1">
+            <a:schemeClr val="accent4"/>
+          </a:fillRef>
+          <a:effectRef idx="0">
+            <a:schemeClr val="accent4"/>
+          </a:effectRef>
+          <a:fontRef idx="minor">
+            <a:schemeClr val="lt1"/>
+          </a:fontRef>
+        </p:style>
+        <p:txBody>
+          <a:bodyPr rtlCol="0" anchor="ctr"/>
+          <a:lstStyle/>
+          <a:p>
+            <a:pPr algn="ctr"/>
+            <a:r>
+              <a:rPr lang="en-US" dirty="0"/>
+              <a:t>BendersSub (27)-(29)</a:t>
+            </a:r>
+          </a:p>
+        </p:txBody>
+      </p:sp>
+      <p:sp>
+        <p:nvSpPr>
+          <p:cNvPr id="14" name="TextBox 13">
+            <a:extLst>
+              <a:ext uri="{FF2B5EF4-FFF2-40B4-BE49-F238E27FC236}">
+                <a16:creationId xmlns:a16="http://schemas.microsoft.com/office/drawing/2014/main" id="{F88CC475-D62E-8948-B586-2C890B7D980C}"/>
+              </a:ext>
+            </a:extLst>
+          </p:cNvPr>
+          <p:cNvSpPr txBox="1"/>
+          <p:nvPr/>
+        </p:nvSpPr>
+        <p:spPr>
+          <a:xfrm>
+            <a:off x="604460" y="318505"/>
+            <a:ext cx="3143893" cy="369332"/>
+          </a:xfrm>
+          <a:prstGeom prst="rect">
+            <a:avLst/>
+          </a:prstGeom>
+          <a:noFill/>
+        </p:spPr>
+        <p:txBody>
+          <a:bodyPr wrap="square" rtlCol="0">
+            <a:spAutoFit/>
+          </a:bodyPr>
+          <a:lstStyle/>
+          <a:p>
+            <a:r>
+              <a:rPr lang="en-US" dirty="0"/>
+              <a:t>M2.cpp</a:t>
+            </a:r>
+          </a:p>
+        </p:txBody>
+      </p:sp>
+      <p:sp>
+        <p:nvSpPr>
+          <p:cNvPr id="16" name="TextBox 15">
+            <a:extLst>
+              <a:ext uri="{FF2B5EF4-FFF2-40B4-BE49-F238E27FC236}">
+                <a16:creationId xmlns:a16="http://schemas.microsoft.com/office/drawing/2014/main" id="{5A514A02-814A-9646-942B-FC7460FFA231}"/>
+              </a:ext>
+            </a:extLst>
+          </p:cNvPr>
+          <p:cNvSpPr txBox="1"/>
+          <p:nvPr/>
+        </p:nvSpPr>
+        <p:spPr>
+          <a:xfrm>
+            <a:off x="604459" y="975776"/>
+            <a:ext cx="3143893" cy="369332"/>
+          </a:xfrm>
+          <a:prstGeom prst="rect">
+            <a:avLst/>
+          </a:prstGeom>
+          <a:noFill/>
+        </p:spPr>
+        <p:txBody>
+          <a:bodyPr wrap="square" rtlCol="0">
+            <a:spAutoFit/>
+          </a:bodyPr>
+          <a:lstStyle/>
+          <a:p>
+            <a:r>
+              <a:rPr lang="en-US" dirty="0"/>
+              <a:t>Instance Classes</a:t>
+            </a:r>
+          </a:p>
+        </p:txBody>
+      </p:sp>
+      <p:sp>
+        <p:nvSpPr>
+          <p:cNvPr id="18" name="TextBox 17">
+            <a:extLst>
+              <a:ext uri="{FF2B5EF4-FFF2-40B4-BE49-F238E27FC236}">
+                <a16:creationId xmlns:a16="http://schemas.microsoft.com/office/drawing/2014/main" id="{7FE4F29A-0D82-5B48-A41F-2309F7D1EDFD}"/>
+              </a:ext>
+            </a:extLst>
+          </p:cNvPr>
+          <p:cNvSpPr txBox="1"/>
+          <p:nvPr/>
+        </p:nvSpPr>
+        <p:spPr>
+          <a:xfrm>
+            <a:off x="604458" y="5569133"/>
+            <a:ext cx="3143893" cy="646331"/>
+          </a:xfrm>
+          <a:prstGeom prst="rect">
+            <a:avLst/>
+          </a:prstGeom>
+          <a:noFill/>
+        </p:spPr>
+        <p:txBody>
+          <a:bodyPr wrap="square" rtlCol="0">
+            <a:spAutoFit/>
+          </a:bodyPr>
+          <a:lstStyle/>
+          <a:p>
+            <a:r>
+              <a:rPr lang="en-US" dirty="0"/>
+              <a:t>Solution Classes (all have a pointer to an </a:t>
+            </a:r>
+            <a:r>
+              <a:rPr lang="en-US" dirty="0">
+                <a:solidFill>
+                  <a:schemeClr val="accent1"/>
+                </a:solidFill>
+              </a:rPr>
+              <a:t>M2Instance</a:t>
+            </a:r>
+            <a:r>
+              <a:rPr lang="en-US" dirty="0"/>
+              <a:t>)</a:t>
+            </a:r>
+          </a:p>
+        </p:txBody>
+      </p:sp>
+      <p:sp>
+        <p:nvSpPr>
+          <p:cNvPr id="19" name="Block Arc 18">
+            <a:extLst>
+              <a:ext uri="{FF2B5EF4-FFF2-40B4-BE49-F238E27FC236}">
+                <a16:creationId xmlns:a16="http://schemas.microsoft.com/office/drawing/2014/main" id="{0A6D161B-60B8-7348-97A4-E30B1B1461B3}"/>
+              </a:ext>
+            </a:extLst>
+          </p:cNvPr>
+          <p:cNvSpPr/>
+          <p:nvPr/>
+        </p:nvSpPr>
+        <p:spPr>
+          <a:xfrm>
+            <a:off x="5987265" y="1890972"/>
+            <a:ext cx="217470" cy="376759"/>
+          </a:xfrm>
+          <a:prstGeom prst="blockArc">
+            <a:avLst/>
+          </a:prstGeom>
+        </p:spPr>
+        <p:style>
+          <a:lnRef idx="2">
+            <a:schemeClr val="accent1">
+              <a:shade val="50000"/>
+            </a:schemeClr>
+          </a:lnRef>
+          <a:fillRef idx="1">
+            <a:schemeClr val="accent1"/>
+          </a:fillRef>
+          <a:effectRef idx="0">
+            <a:schemeClr val="accent1"/>
+          </a:effectRef>
+          <a:fontRef idx="minor">
+            <a:schemeClr val="lt1"/>
+          </a:fontRef>
+        </p:style>
+        <p:txBody>
+          <a:bodyPr rtlCol="0" anchor="ctr"/>
+          <a:lstStyle/>
+          <a:p>
+            <a:pPr algn="ctr"/>
+            <a:endParaRPr lang="en-US">
+              <a:solidFill>
+                <a:schemeClr val="tx1"/>
+              </a:solidFill>
+            </a:endParaRPr>
+          </a:p>
+        </p:txBody>
+      </p:sp>
+      <p:sp>
+        <p:nvSpPr>
+          <p:cNvPr id="20" name="Block Arc 19">
+            <a:extLst>
+              <a:ext uri="{FF2B5EF4-FFF2-40B4-BE49-F238E27FC236}">
+                <a16:creationId xmlns:a16="http://schemas.microsoft.com/office/drawing/2014/main" id="{ADCAF580-DF61-EC41-9B97-B62EB02360C4}"/>
+              </a:ext>
+            </a:extLst>
+          </p:cNvPr>
+          <p:cNvSpPr/>
+          <p:nvPr/>
+        </p:nvSpPr>
+        <p:spPr>
+          <a:xfrm rot="10800000">
+            <a:off x="9958230" y="5180757"/>
+            <a:ext cx="217470" cy="376759"/>
+          </a:xfrm>
+          <a:prstGeom prst="blockArc">
+            <a:avLst/>
+          </a:prstGeom>
+        </p:spPr>
+        <p:style>
+          <a:lnRef idx="2">
+            <a:schemeClr val="accent1">
+              <a:shade val="50000"/>
+            </a:schemeClr>
+          </a:lnRef>
+          <a:fillRef idx="1">
+            <a:schemeClr val="accent1"/>
+          </a:fillRef>
+          <a:effectRef idx="0">
+            <a:schemeClr val="accent1"/>
+          </a:effectRef>
+          <a:fontRef idx="minor">
+            <a:schemeClr val="lt1"/>
+          </a:fontRef>
+        </p:style>
+        <p:txBody>
+          <a:bodyPr rtlCol="0" anchor="ctr"/>
+          <a:lstStyle/>
+          <a:p>
+            <a:pPr algn="ctr"/>
+            <a:endParaRPr lang="en-US">
+              <a:solidFill>
+                <a:schemeClr val="tx1"/>
+              </a:solidFill>
+            </a:endParaRPr>
+          </a:p>
+        </p:txBody>
+      </p:sp>
+      <p:sp>
+        <p:nvSpPr>
+          <p:cNvPr id="21" name="Block Arc 20">
+            <a:extLst>
+              <a:ext uri="{FF2B5EF4-FFF2-40B4-BE49-F238E27FC236}">
+                <a16:creationId xmlns:a16="http://schemas.microsoft.com/office/drawing/2014/main" id="{2FAE255C-1835-1D47-A080-6056FF59320B}"/>
+              </a:ext>
+            </a:extLst>
+          </p:cNvPr>
+          <p:cNvSpPr/>
+          <p:nvPr/>
+        </p:nvSpPr>
+        <p:spPr>
+          <a:xfrm rot="10800000">
+            <a:off x="9958230" y="4132778"/>
+            <a:ext cx="217470" cy="376759"/>
+          </a:xfrm>
+          <a:prstGeom prst="blockArc">
+            <a:avLst/>
+          </a:prstGeom>
+        </p:spPr>
+        <p:style>
+          <a:lnRef idx="2">
+            <a:schemeClr val="accent1">
+              <a:shade val="50000"/>
+            </a:schemeClr>
+          </a:lnRef>
+          <a:fillRef idx="1">
+            <a:schemeClr val="accent1"/>
+          </a:fillRef>
+          <a:effectRef idx="0">
+            <a:schemeClr val="accent1"/>
+          </a:effectRef>
+          <a:fontRef idx="minor">
+            <a:schemeClr val="lt1"/>
+          </a:fontRef>
+        </p:style>
+        <p:txBody>
+          <a:bodyPr rtlCol="0" anchor="ctr"/>
+          <a:lstStyle/>
+          <a:p>
+            <a:pPr algn="ctr"/>
+            <a:endParaRPr lang="en-US">
+              <a:solidFill>
+                <a:schemeClr val="tx1"/>
+              </a:solidFill>
+            </a:endParaRPr>
           </a:p>
         </p:txBody>
       </p:sp>
@@ -3630,6 +4088,517 @@
     <p:extLst>
       <p:ext uri="{BB962C8B-B14F-4D97-AF65-F5344CB8AC3E}">
         <p14:creationId xmlns:p14="http://schemas.microsoft.com/office/powerpoint/2010/main" val="1208465692"/>
+      </p:ext>
+    </p:extLst>
+  </p:cSld>
+  <p:clrMapOvr>
+    <a:masterClrMapping/>
+  </p:clrMapOvr>
+</p:sld>
+</file>
+
+<file path=ppt/slides/slide3.xml><?xml version="1.0" encoding="utf-8"?>
+<p:sld xmlns:a="http://schemas.openxmlformats.org/drawingml/2006/main" xmlns:r="http://schemas.openxmlformats.org/officeDocument/2006/relationships" xmlns:p="http://schemas.openxmlformats.org/presentationml/2006/main">
+  <p:cSld>
+    <p:spTree>
+      <p:nvGrpSpPr>
+        <p:cNvPr id="1" name=""/>
+        <p:cNvGrpSpPr/>
+        <p:nvPr/>
+      </p:nvGrpSpPr>
+      <p:grpSpPr>
+        <a:xfrm>
+          <a:off x="0" y="0"/>
+          <a:ext cx="0" cy="0"/>
+          <a:chOff x="0" y="0"/>
+          <a:chExt cx="0" cy="0"/>
+        </a:xfrm>
+      </p:grpSpPr>
+      <p:sp>
+        <p:nvSpPr>
+          <p:cNvPr id="2" name="Title 1">
+            <a:extLst>
+              <a:ext uri="{FF2B5EF4-FFF2-40B4-BE49-F238E27FC236}">
+                <a16:creationId xmlns:a16="http://schemas.microsoft.com/office/drawing/2014/main" id="{E4CBAAF4-691D-4B4A-98A2-71DCF931EAB8}"/>
+              </a:ext>
+            </a:extLst>
+          </p:cNvPr>
+          <p:cNvSpPr>
+            <a:spLocks noGrp="1"/>
+          </p:cNvSpPr>
+          <p:nvPr>
+            <p:ph type="title"/>
+          </p:nvPr>
+        </p:nvSpPr>
+        <p:spPr/>
+        <p:txBody>
+          <a:bodyPr/>
+          <a:lstStyle/>
+          <a:p>
+            <a:r>
+              <a:rPr lang="en-US" dirty="0"/>
+              <a:t>Example Instance – “simplegraph” (r_0 = 2)</a:t>
+            </a:r>
+          </a:p>
+        </p:txBody>
+      </p:sp>
+      <p:sp>
+        <p:nvSpPr>
+          <p:cNvPr id="4" name="Oval 3">
+            <a:extLst>
+              <a:ext uri="{FF2B5EF4-FFF2-40B4-BE49-F238E27FC236}">
+                <a16:creationId xmlns:a16="http://schemas.microsoft.com/office/drawing/2014/main" id="{2FF137C1-E340-F14C-9C9B-034F1BE3AAFB}"/>
+              </a:ext>
+            </a:extLst>
+          </p:cNvPr>
+          <p:cNvSpPr/>
+          <p:nvPr/>
+        </p:nvSpPr>
+        <p:spPr>
+          <a:xfrm>
+            <a:off x="1931541" y="3172146"/>
+            <a:ext cx="472611" cy="513708"/>
+          </a:xfrm>
+          <a:prstGeom prst="ellipse">
+            <a:avLst/>
+          </a:prstGeom>
+        </p:spPr>
+        <p:style>
+          <a:lnRef idx="2">
+            <a:schemeClr val="accent6"/>
+          </a:lnRef>
+          <a:fillRef idx="1">
+            <a:schemeClr val="lt1"/>
+          </a:fillRef>
+          <a:effectRef idx="0">
+            <a:schemeClr val="accent6"/>
+          </a:effectRef>
+          <a:fontRef idx="minor">
+            <a:schemeClr val="dk1"/>
+          </a:fontRef>
+        </p:style>
+        <p:txBody>
+          <a:bodyPr rtlCol="0" anchor="ctr"/>
+          <a:lstStyle/>
+          <a:p>
+            <a:pPr algn="ctr"/>
+            <a:r>
+              <a:rPr lang="en-US" dirty="0"/>
+              <a:t>0</a:t>
+            </a:r>
+          </a:p>
+        </p:txBody>
+      </p:sp>
+      <p:sp>
+        <p:nvSpPr>
+          <p:cNvPr id="5" name="Oval 4">
+            <a:extLst>
+              <a:ext uri="{FF2B5EF4-FFF2-40B4-BE49-F238E27FC236}">
+                <a16:creationId xmlns:a16="http://schemas.microsoft.com/office/drawing/2014/main" id="{DEE94978-AF3F-4048-B60D-3E29097DAF20}"/>
+              </a:ext>
+            </a:extLst>
+          </p:cNvPr>
+          <p:cNvSpPr/>
+          <p:nvPr/>
+        </p:nvSpPr>
+        <p:spPr>
+          <a:xfrm>
+            <a:off x="9510444" y="3172146"/>
+            <a:ext cx="472611" cy="513708"/>
+          </a:xfrm>
+          <a:prstGeom prst="ellipse">
+            <a:avLst/>
+          </a:prstGeom>
+        </p:spPr>
+        <p:style>
+          <a:lnRef idx="2">
+            <a:schemeClr val="accent6"/>
+          </a:lnRef>
+          <a:fillRef idx="1">
+            <a:schemeClr val="lt1"/>
+          </a:fillRef>
+          <a:effectRef idx="0">
+            <a:schemeClr val="accent6"/>
+          </a:effectRef>
+          <a:fontRef idx="minor">
+            <a:schemeClr val="dk1"/>
+          </a:fontRef>
+        </p:style>
+        <p:txBody>
+          <a:bodyPr rtlCol="0" anchor="ctr"/>
+          <a:lstStyle/>
+          <a:p>
+            <a:pPr algn="ctr"/>
+            <a:r>
+              <a:rPr lang="en-US" dirty="0"/>
+              <a:t>1</a:t>
+            </a:r>
+          </a:p>
+        </p:txBody>
+      </p:sp>
+      <p:cxnSp>
+        <p:nvCxnSpPr>
+          <p:cNvPr id="7" name="Straight Arrow Connector 6">
+            <a:extLst>
+              <a:ext uri="{FF2B5EF4-FFF2-40B4-BE49-F238E27FC236}">
+                <a16:creationId xmlns:a16="http://schemas.microsoft.com/office/drawing/2014/main" id="{148FAE9F-E8FE-EA44-85D1-AC09647E869D}"/>
+              </a:ext>
+            </a:extLst>
+          </p:cNvPr>
+          <p:cNvCxnSpPr>
+            <a:cxnSpLocks/>
+            <a:stCxn id="4" idx="6"/>
+            <a:endCxn id="5" idx="2"/>
+          </p:cNvCxnSpPr>
+          <p:nvPr/>
+        </p:nvCxnSpPr>
+        <p:spPr>
+          <a:xfrm>
+            <a:off x="2404152" y="3429000"/>
+            <a:ext cx="7106292" cy="0"/>
+          </a:xfrm>
+          <a:prstGeom prst="straightConnector1">
+            <a:avLst/>
+          </a:prstGeom>
+          <a:ln>
+            <a:tailEnd type="triangle"/>
+          </a:ln>
+        </p:spPr>
+        <p:style>
+          <a:lnRef idx="1">
+            <a:schemeClr val="accent1"/>
+          </a:lnRef>
+          <a:fillRef idx="0">
+            <a:schemeClr val="accent1"/>
+          </a:fillRef>
+          <a:effectRef idx="0">
+            <a:schemeClr val="accent1"/>
+          </a:effectRef>
+          <a:fontRef idx="minor">
+            <a:schemeClr val="tx1"/>
+          </a:fontRef>
+        </p:style>
+      </p:cxnSp>
+      <p:cxnSp>
+        <p:nvCxnSpPr>
+          <p:cNvPr id="11" name="Curved Connector 10">
+            <a:extLst>
+              <a:ext uri="{FF2B5EF4-FFF2-40B4-BE49-F238E27FC236}">
+                <a16:creationId xmlns:a16="http://schemas.microsoft.com/office/drawing/2014/main" id="{803AE404-1AA7-AC4D-A2FA-CE5508637F2A}"/>
+              </a:ext>
+            </a:extLst>
+          </p:cNvPr>
+          <p:cNvCxnSpPr>
+            <a:cxnSpLocks/>
+            <a:stCxn id="4" idx="0"/>
+            <a:endCxn id="5" idx="0"/>
+          </p:cNvCxnSpPr>
+          <p:nvPr/>
+        </p:nvCxnSpPr>
+        <p:spPr>
+          <a:xfrm rot="5400000" flipH="1" flipV="1">
+            <a:off x="5957298" y="-617305"/>
+            <a:ext cx="12700" cy="7578903"/>
+          </a:xfrm>
+          <a:prstGeom prst="curvedConnector3">
+            <a:avLst>
+              <a:gd name="adj1" fmla="val 6492134"/>
+            </a:avLst>
+          </a:prstGeom>
+          <a:ln>
+            <a:tailEnd type="triangle"/>
+          </a:ln>
+        </p:spPr>
+        <p:style>
+          <a:lnRef idx="1">
+            <a:schemeClr val="accent1"/>
+          </a:lnRef>
+          <a:fillRef idx="0">
+            <a:schemeClr val="accent1"/>
+          </a:fillRef>
+          <a:effectRef idx="0">
+            <a:schemeClr val="accent1"/>
+          </a:effectRef>
+          <a:fontRef idx="minor">
+            <a:schemeClr val="tx1"/>
+          </a:fontRef>
+        </p:style>
+      </p:cxnSp>
+      <p:cxnSp>
+        <p:nvCxnSpPr>
+          <p:cNvPr id="15" name="Curved Connector 14">
+            <a:extLst>
+              <a:ext uri="{FF2B5EF4-FFF2-40B4-BE49-F238E27FC236}">
+                <a16:creationId xmlns:a16="http://schemas.microsoft.com/office/drawing/2014/main" id="{AB05C450-71BA-C743-A17C-59D35A18ADCF}"/>
+              </a:ext>
+            </a:extLst>
+          </p:cNvPr>
+          <p:cNvCxnSpPr>
+            <a:cxnSpLocks/>
+            <a:stCxn id="4" idx="4"/>
+            <a:endCxn id="5" idx="4"/>
+          </p:cNvCxnSpPr>
+          <p:nvPr/>
+        </p:nvCxnSpPr>
+        <p:spPr>
+          <a:xfrm rot="16200000" flipH="1">
+            <a:off x="5957298" y="-103598"/>
+            <a:ext cx="12700" cy="7578903"/>
+          </a:xfrm>
+          <a:prstGeom prst="curvedConnector3">
+            <a:avLst>
+              <a:gd name="adj1" fmla="val 7832449"/>
+            </a:avLst>
+          </a:prstGeom>
+          <a:ln>
+            <a:tailEnd type="triangle"/>
+          </a:ln>
+        </p:spPr>
+        <p:style>
+          <a:lnRef idx="1">
+            <a:schemeClr val="accent1"/>
+          </a:lnRef>
+          <a:fillRef idx="0">
+            <a:schemeClr val="accent1"/>
+          </a:fillRef>
+          <a:effectRef idx="0">
+            <a:schemeClr val="accent1"/>
+          </a:effectRef>
+          <a:fontRef idx="minor">
+            <a:schemeClr val="tx1"/>
+          </a:fontRef>
+        </p:style>
+      </p:cxnSp>
+      <p:sp>
+        <p:nvSpPr>
+          <p:cNvPr id="20" name="TextBox 19">
+            <a:extLst>
+              <a:ext uri="{FF2B5EF4-FFF2-40B4-BE49-F238E27FC236}">
+                <a16:creationId xmlns:a16="http://schemas.microsoft.com/office/drawing/2014/main" id="{6D3D5302-6C86-2C46-8F4E-0EDEE56D34FE}"/>
+              </a:ext>
+            </a:extLst>
+          </p:cNvPr>
+          <p:cNvSpPr txBox="1"/>
+          <p:nvPr/>
+        </p:nvSpPr>
+        <p:spPr>
+          <a:xfrm>
+            <a:off x="5577016" y="4319973"/>
+            <a:ext cx="1037967" cy="369332"/>
+          </a:xfrm>
+          <a:prstGeom prst="rect">
+            <a:avLst/>
+          </a:prstGeom>
+          <a:noFill/>
+        </p:spPr>
+        <p:txBody>
+          <a:bodyPr wrap="square" rtlCol="0">
+            <a:spAutoFit/>
+          </a:bodyPr>
+          <a:lstStyle/>
+          <a:p>
+            <a:r>
+              <a:rPr lang="en-US" dirty="0"/>
+              <a:t>3, 10, 10</a:t>
+            </a:r>
+          </a:p>
+        </p:txBody>
+      </p:sp>
+      <p:sp>
+        <p:nvSpPr>
+          <p:cNvPr id="21" name="TextBox 20">
+            <a:extLst>
+              <a:ext uri="{FF2B5EF4-FFF2-40B4-BE49-F238E27FC236}">
+                <a16:creationId xmlns:a16="http://schemas.microsoft.com/office/drawing/2014/main" id="{89175EA6-562F-444F-9C4B-857E25F6ED9D}"/>
+              </a:ext>
+            </a:extLst>
+          </p:cNvPr>
+          <p:cNvSpPr txBox="1"/>
+          <p:nvPr/>
+        </p:nvSpPr>
+        <p:spPr>
+          <a:xfrm>
+            <a:off x="5568777" y="3051734"/>
+            <a:ext cx="1037967" cy="369332"/>
+          </a:xfrm>
+          <a:prstGeom prst="rect">
+            <a:avLst/>
+          </a:prstGeom>
+          <a:noFill/>
+        </p:spPr>
+        <p:txBody>
+          <a:bodyPr wrap="square" rtlCol="0">
+            <a:spAutoFit/>
+          </a:bodyPr>
+          <a:lstStyle/>
+          <a:p>
+            <a:r>
+              <a:rPr lang="en-US" dirty="0"/>
+              <a:t>12, 1, 12</a:t>
+            </a:r>
+          </a:p>
+        </p:txBody>
+      </p:sp>
+      <p:sp>
+        <p:nvSpPr>
+          <p:cNvPr id="22" name="TextBox 21">
+            <a:extLst>
+              <a:ext uri="{FF2B5EF4-FFF2-40B4-BE49-F238E27FC236}">
+                <a16:creationId xmlns:a16="http://schemas.microsoft.com/office/drawing/2014/main" id="{5DF614EB-DF45-1C41-A15C-5F8D8D2E6753}"/>
+              </a:ext>
+            </a:extLst>
+          </p:cNvPr>
+          <p:cNvSpPr txBox="1"/>
+          <p:nvPr/>
+        </p:nvSpPr>
+        <p:spPr>
+          <a:xfrm>
+            <a:off x="5585252" y="2001879"/>
+            <a:ext cx="1037967" cy="369332"/>
+          </a:xfrm>
+          <a:prstGeom prst="rect">
+            <a:avLst/>
+          </a:prstGeom>
+          <a:noFill/>
+        </p:spPr>
+        <p:txBody>
+          <a:bodyPr wrap="square" rtlCol="0">
+            <a:spAutoFit/>
+          </a:bodyPr>
+          <a:lstStyle/>
+          <a:p>
+            <a:r>
+              <a:rPr lang="en-US" dirty="0"/>
+              <a:t>9, 9, 9</a:t>
+            </a:r>
+          </a:p>
+        </p:txBody>
+      </p:sp>
+      <p:sp>
+        <p:nvSpPr>
+          <p:cNvPr id="3" name="TextBox 2">
+            <a:extLst>
+              <a:ext uri="{FF2B5EF4-FFF2-40B4-BE49-F238E27FC236}">
+                <a16:creationId xmlns:a16="http://schemas.microsoft.com/office/drawing/2014/main" id="{7A4FE1AF-47AE-C048-A039-6B7220B57F46}"/>
+              </a:ext>
+            </a:extLst>
+          </p:cNvPr>
+          <p:cNvSpPr txBox="1"/>
+          <p:nvPr/>
+        </p:nvSpPr>
+        <p:spPr>
+          <a:xfrm>
+            <a:off x="9983056" y="4828854"/>
+            <a:ext cx="1030842" cy="646331"/>
+          </a:xfrm>
+          <a:prstGeom prst="rect">
+            <a:avLst/>
+          </a:prstGeom>
+          <a:noFill/>
+        </p:spPr>
+        <p:txBody>
+          <a:bodyPr wrap="square" rtlCol="0">
+            <a:spAutoFit/>
+          </a:bodyPr>
+          <a:lstStyle/>
+          <a:p>
+            <a:r>
+              <a:rPr lang="en-US" dirty="0">
+                <a:solidFill>
+                  <a:srgbClr val="FF0000"/>
+                </a:solidFill>
+              </a:rPr>
+              <a:t>Optimal (9)</a:t>
+            </a:r>
+          </a:p>
+        </p:txBody>
+      </p:sp>
+      <p:cxnSp>
+        <p:nvCxnSpPr>
+          <p:cNvPr id="8" name="Straight Connector 7">
+            <a:extLst>
+              <a:ext uri="{FF2B5EF4-FFF2-40B4-BE49-F238E27FC236}">
+                <a16:creationId xmlns:a16="http://schemas.microsoft.com/office/drawing/2014/main" id="{2E11ABB1-A583-2C48-A4C3-49E34D0779A7}"/>
+              </a:ext>
+            </a:extLst>
+          </p:cNvPr>
+          <p:cNvCxnSpPr/>
+          <p:nvPr/>
+        </p:nvCxnSpPr>
+        <p:spPr>
+          <a:xfrm>
+            <a:off x="7582328" y="3277456"/>
+            <a:ext cx="71919" cy="402047"/>
+          </a:xfrm>
+          <a:prstGeom prst="line">
+            <a:avLst/>
+          </a:prstGeom>
+          <a:ln>
+            <a:solidFill>
+              <a:srgbClr val="FF0000"/>
+            </a:solidFill>
+          </a:ln>
+        </p:spPr>
+        <p:style>
+          <a:lnRef idx="3">
+            <a:schemeClr val="accent2"/>
+          </a:lnRef>
+          <a:fillRef idx="0">
+            <a:schemeClr val="accent2"/>
+          </a:fillRef>
+          <a:effectRef idx="2">
+            <a:schemeClr val="accent2"/>
+          </a:effectRef>
+          <a:fontRef idx="minor">
+            <a:schemeClr val="tx1"/>
+          </a:fontRef>
+        </p:style>
+      </p:cxnSp>
+      <p:cxnSp>
+        <p:nvCxnSpPr>
+          <p:cNvPr id="14" name="Straight Connector 13">
+            <a:extLst>
+              <a:ext uri="{FF2B5EF4-FFF2-40B4-BE49-F238E27FC236}">
+                <a16:creationId xmlns:a16="http://schemas.microsoft.com/office/drawing/2014/main" id="{DAD389D4-1656-8542-81D4-3C16D294BEA0}"/>
+              </a:ext>
+            </a:extLst>
+          </p:cNvPr>
+          <p:cNvCxnSpPr/>
+          <p:nvPr/>
+        </p:nvCxnSpPr>
+        <p:spPr>
+          <a:xfrm>
+            <a:off x="7654247" y="4352150"/>
+            <a:ext cx="71919" cy="402047"/>
+          </a:xfrm>
+          <a:prstGeom prst="line">
+            <a:avLst/>
+          </a:prstGeom>
+          <a:ln>
+            <a:solidFill>
+              <a:srgbClr val="FF0000"/>
+            </a:solidFill>
+          </a:ln>
+        </p:spPr>
+        <p:style>
+          <a:lnRef idx="3">
+            <a:schemeClr val="accent2"/>
+          </a:lnRef>
+          <a:fillRef idx="0">
+            <a:schemeClr val="accent2"/>
+          </a:fillRef>
+          <a:effectRef idx="2">
+            <a:schemeClr val="accent2"/>
+          </a:effectRef>
+          <a:fontRef idx="minor">
+            <a:schemeClr val="tx1"/>
+          </a:fontRef>
+        </p:style>
+      </p:cxnSp>
+    </p:spTree>
+    <p:extLst>
+      <p:ext uri="{BB962C8B-B14F-4D97-AF65-F5344CB8AC3E}">
+        <p14:creationId xmlns:p14="http://schemas.microsoft.com/office/powerpoint/2010/main" val="3474030838"/>
       </p:ext>
     </p:extLst>
   </p:cSld>

</xml_diff>